<commit_message>
grammar edits, fix path name
</commit_message>
<xml_diff>
--- a/learn-bizapps-pr/power-virtual-agents/power-virtual-agents-bots/media-layered/pva-images.pptx
+++ b/learn-bizapps-pr/power-virtual-agents/power-virtual-agents-bots/media-layered/pva-images.pptx
@@ -277,7 +277,7 @@
           <a:p>
             <a:fld id="{2B766067-6C15-4394-8C2D-D4544BE4FFA5}" type="datetimeFigureOut">
               <a:rPr lang="en-US" smtClean="0"/>
-              <a:t>6/23/2020</a:t>
+              <a:t>8/7/2020</a:t>
             </a:fld>
             <a:endParaRPr lang="en-US"/>
           </a:p>
@@ -475,7 +475,7 @@
           <a:p>
             <a:fld id="{2B766067-6C15-4394-8C2D-D4544BE4FFA5}" type="datetimeFigureOut">
               <a:rPr lang="en-US" smtClean="0"/>
-              <a:t>6/23/2020</a:t>
+              <a:t>8/7/2020</a:t>
             </a:fld>
             <a:endParaRPr lang="en-US"/>
           </a:p>
@@ -683,7 +683,7 @@
           <a:p>
             <a:fld id="{2B766067-6C15-4394-8C2D-D4544BE4FFA5}" type="datetimeFigureOut">
               <a:rPr lang="en-US" smtClean="0"/>
-              <a:t>6/23/2020</a:t>
+              <a:t>8/7/2020</a:t>
             </a:fld>
             <a:endParaRPr lang="en-US"/>
           </a:p>
@@ -881,7 +881,7 @@
           <a:p>
             <a:fld id="{2B766067-6C15-4394-8C2D-D4544BE4FFA5}" type="datetimeFigureOut">
               <a:rPr lang="en-US" smtClean="0"/>
-              <a:t>6/23/2020</a:t>
+              <a:t>8/7/2020</a:t>
             </a:fld>
             <a:endParaRPr lang="en-US"/>
           </a:p>
@@ -1156,7 +1156,7 @@
           <a:p>
             <a:fld id="{2B766067-6C15-4394-8C2D-D4544BE4FFA5}" type="datetimeFigureOut">
               <a:rPr lang="en-US" smtClean="0"/>
-              <a:t>6/23/2020</a:t>
+              <a:t>8/7/2020</a:t>
             </a:fld>
             <a:endParaRPr lang="en-US"/>
           </a:p>
@@ -1421,7 +1421,7 @@
           <a:p>
             <a:fld id="{2B766067-6C15-4394-8C2D-D4544BE4FFA5}" type="datetimeFigureOut">
               <a:rPr lang="en-US" smtClean="0"/>
-              <a:t>6/23/2020</a:t>
+              <a:t>8/7/2020</a:t>
             </a:fld>
             <a:endParaRPr lang="en-US"/>
           </a:p>
@@ -1833,7 +1833,7 @@
           <a:p>
             <a:fld id="{2B766067-6C15-4394-8C2D-D4544BE4FFA5}" type="datetimeFigureOut">
               <a:rPr lang="en-US" smtClean="0"/>
-              <a:t>6/23/2020</a:t>
+              <a:t>8/7/2020</a:t>
             </a:fld>
             <a:endParaRPr lang="en-US"/>
           </a:p>
@@ -1974,7 +1974,7 @@
           <a:p>
             <a:fld id="{2B766067-6C15-4394-8C2D-D4544BE4FFA5}" type="datetimeFigureOut">
               <a:rPr lang="en-US" smtClean="0"/>
-              <a:t>6/23/2020</a:t>
+              <a:t>8/7/2020</a:t>
             </a:fld>
             <a:endParaRPr lang="en-US"/>
           </a:p>
@@ -2087,7 +2087,7 @@
           <a:p>
             <a:fld id="{2B766067-6C15-4394-8C2D-D4544BE4FFA5}" type="datetimeFigureOut">
               <a:rPr lang="en-US" smtClean="0"/>
-              <a:t>6/23/2020</a:t>
+              <a:t>8/7/2020</a:t>
             </a:fld>
             <a:endParaRPr lang="en-US"/>
           </a:p>
@@ -2398,7 +2398,7 @@
           <a:p>
             <a:fld id="{2B766067-6C15-4394-8C2D-D4544BE4FFA5}" type="datetimeFigureOut">
               <a:rPr lang="en-US" smtClean="0"/>
-              <a:t>6/23/2020</a:t>
+              <a:t>8/7/2020</a:t>
             </a:fld>
             <a:endParaRPr lang="en-US"/>
           </a:p>
@@ -2686,7 +2686,7 @@
           <a:p>
             <a:fld id="{2B766067-6C15-4394-8C2D-D4544BE4FFA5}" type="datetimeFigureOut">
               <a:rPr lang="en-US" smtClean="0"/>
-              <a:t>6/23/2020</a:t>
+              <a:t>8/7/2020</a:t>
             </a:fld>
             <a:endParaRPr lang="en-US"/>
           </a:p>
@@ -2927,7 +2927,7 @@
           <a:p>
             <a:fld id="{2B766067-6C15-4394-8C2D-D4544BE4FFA5}" type="datetimeFigureOut">
               <a:rPr lang="en-US" smtClean="0"/>
-              <a:t>6/23/2020</a:t>
+              <a:t>8/7/2020</a:t>
             </a:fld>
             <a:endParaRPr lang="en-US"/>
           </a:p>
@@ -3528,7 +3528,7 @@
           <a:noFill/>
         </p:spPr>
         <p:txBody>
-          <a:bodyPr wrap="square" rtlCol="0">
+          <a:bodyPr wrap="square" rtlCol="0" anchor="t">
             <a:spAutoFit/>
           </a:bodyPr>
           <a:lstStyle/>
@@ -3547,7 +3547,37 @@
                   </a:outerShdw>
                 </a:effectLst>
               </a:rPr>
-              <a:t>Power Virtual Agent Benefits</a:t>
+              <a:t>Power Virtual </a:t>
+            </a:r>
+            <a:r>
+              <a:rPr lang="en-US" sz="3600" b="1">
+                <a:solidFill>
+                  <a:schemeClr val="bg1"/>
+                </a:solidFill>
+                <a:effectLst>
+                  <a:outerShdw blurRad="38100" dist="38100" dir="2700000" algn="tl">
+                    <a:srgbClr val="000000">
+                      <a:alpha val="43137"/>
+                    </a:srgbClr>
+                  </a:outerShdw>
+                </a:effectLst>
+              </a:rPr>
+              <a:t>Agents </a:t>
+            </a:r>
+            <a:r>
+              <a:rPr lang="en-US" sz="3600" b="1" dirty="0">
+                <a:solidFill>
+                  <a:schemeClr val="bg1"/>
+                </a:solidFill>
+                <a:effectLst>
+                  <a:outerShdw blurRad="38100" dist="38100" dir="2700000" algn="tl">
+                    <a:srgbClr val="000000">
+                      <a:alpha val="43137"/>
+                    </a:srgbClr>
+                  </a:outerShdw>
+                </a:effectLst>
+              </a:rPr>
+              <a:t>Benefits</a:t>
             </a:r>
           </a:p>
         </p:txBody>
@@ -4950,7 +4980,7 @@
             <a:pPr algn="ctr"/>
             <a:r>
               <a:rPr lang="en-US" dirty="0"/>
-              <a:t>Trigger phrases will be pre-populated based on what you defined on the previous screen.</a:t>
+              <a:t>Trigger phrases will be prepopulated based on what you defined on the previous screen.</a:t>
             </a:r>
           </a:p>
         </p:txBody>
@@ -5051,7 +5081,7 @@
             <a:pPr algn="ctr"/>
             <a:r>
               <a:rPr lang="en-US" dirty="0"/>
-              <a:t>Message will be blank by default, you will need to supply necessary text.</a:t>
+              <a:t>Message will be blank by default; you will need to supply necessary text.</a:t>
             </a:r>
           </a:p>
         </p:txBody>
@@ -5691,7 +5721,7 @@
             <a:pPr algn="ctr"/>
             <a:r>
               <a:rPr lang="en-US" dirty="0"/>
-              <a:t>Toggles between test and hide depending on if the test bot window is displayed.</a:t>
+              <a:t>Switches between test and hide depending on if the test bot window is displayed.</a:t>
             </a:r>
           </a:p>
         </p:txBody>
@@ -6017,7 +6047,7 @@
             <a:pPr algn="ctr"/>
             <a:r>
               <a:rPr lang="en-US" dirty="0"/>
-              <a:t>Icon indicates if item was successful or not.</a:t>
+              <a:t>Icon indicates success.</a:t>
             </a:r>
           </a:p>
         </p:txBody>
@@ -6033,14 +6063,13 @@
           </p:cNvPr>
           <p:cNvCxnSpPr>
             <a:cxnSpLocks/>
-            <a:stCxn id="10" idx="1"/>
           </p:cNvCxnSpPr>
           <p:nvPr/>
         </p:nvCxnSpPr>
         <p:spPr>
-          <a:xfrm flipH="1">
-            <a:off x="5162551" y="113995"/>
-            <a:ext cx="291026" cy="0"/>
+          <a:xfrm flipV="1">
+            <a:off x="4660232" y="342595"/>
+            <a:ext cx="0" cy="255867"/>
           </a:xfrm>
           <a:prstGeom prst="straightConnector1">
             <a:avLst/>
@@ -6081,7 +6110,7 @@
         </p:nvSpPr>
         <p:spPr>
           <a:xfrm>
-            <a:off x="5453577" y="-219685"/>
+            <a:off x="4081977" y="598462"/>
             <a:ext cx="2795074" cy="667360"/>
           </a:xfrm>
           <a:prstGeom prst="roundRect">
@@ -6651,7 +6680,7 @@
             <a:pPr algn="ctr"/>
             <a:r>
               <a:rPr lang="en-US" dirty="0"/>
-              <a:t>Select the best region that based on your location. </a:t>
+              <a:t>Select the best region based on your location. </a:t>
             </a:r>
           </a:p>
         </p:txBody>

</xml_diff>